<commit_message>
added some material afterwards
</commit_message>
<xml_diff>
--- a/CSCI-111/week-10/week-10-lecture.pptx
+++ b/CSCI-111/week-10/week-10-lecture.pptx
@@ -804,7 +804,7 @@
   <p:cSld>
     <p:spTree>
       <p:nvGrpSpPr>
-        <p:cNvPr id="103" name="Shape 103"/>
+        <p:cNvPr id="104" name="Shape 104"/>
         <p:cNvGrpSpPr/>
         <p:nvPr/>
       </p:nvGrpSpPr>
@@ -818,7 +818,7 @@
       </p:grpSpPr>
       <p:sp>
         <p:nvSpPr>
-          <p:cNvPr id="104" name="Google Shape;104;g30a6bbba716_0_55:notes"/>
+          <p:cNvPr id="105" name="Google Shape;105;g30a6bbba716_0_55:notes"/>
           <p:cNvSpPr/>
           <p:nvPr>
             <p:ph idx="2" type="sldImg"/>
@@ -853,7 +853,7 @@
       </p:sp>
       <p:sp>
         <p:nvSpPr>
-          <p:cNvPr id="105" name="Google Shape;105;g30a6bbba716_0_55:notes"/>
+          <p:cNvPr id="106" name="Google Shape;106;g30a6bbba716_0_55:notes"/>
           <p:cNvSpPr txBox="1"/>
           <p:nvPr>
             <p:ph idx="1" type="body"/>
@@ -903,7 +903,7 @@
   <p:cSld>
     <p:spTree>
       <p:nvGrpSpPr>
-        <p:cNvPr id="109" name="Shape 109"/>
+        <p:cNvPr id="110" name="Shape 110"/>
         <p:cNvGrpSpPr/>
         <p:nvPr/>
       </p:nvGrpSpPr>
@@ -917,7 +917,7 @@
       </p:grpSpPr>
       <p:sp>
         <p:nvSpPr>
-          <p:cNvPr id="110" name="Google Shape;110;g30a6bbba716_0_61:notes"/>
+          <p:cNvPr id="111" name="Google Shape;111;g30a6bbba716_0_61:notes"/>
           <p:cNvSpPr/>
           <p:nvPr>
             <p:ph idx="2" type="sldImg"/>
@@ -952,7 +952,7 @@
       </p:sp>
       <p:sp>
         <p:nvSpPr>
-          <p:cNvPr id="111" name="Google Shape;111;g30a6bbba716_0_61:notes"/>
+          <p:cNvPr id="112" name="Google Shape;112;g30a6bbba716_0_61:notes"/>
           <p:cNvSpPr txBox="1"/>
           <p:nvPr>
             <p:ph idx="1" type="body"/>
@@ -1002,7 +1002,7 @@
   <p:cSld>
     <p:spTree>
       <p:nvGrpSpPr>
-        <p:cNvPr id="115" name="Shape 115"/>
+        <p:cNvPr id="116" name="Shape 116"/>
         <p:cNvGrpSpPr/>
         <p:nvPr/>
       </p:nvGrpSpPr>
@@ -1016,7 +1016,7 @@
       </p:grpSpPr>
       <p:sp>
         <p:nvSpPr>
-          <p:cNvPr id="116" name="Google Shape;116;g30a6bbba716_0_67:notes"/>
+          <p:cNvPr id="117" name="Google Shape;117;g30a6bbba716_0_67:notes"/>
           <p:cNvSpPr/>
           <p:nvPr>
             <p:ph idx="2" type="sldImg"/>
@@ -1051,7 +1051,7 @@
       </p:sp>
       <p:sp>
         <p:nvSpPr>
-          <p:cNvPr id="117" name="Google Shape;117;g30a6bbba716_0_67:notes"/>
+          <p:cNvPr id="118" name="Google Shape;118;g30a6bbba716_0_67:notes"/>
           <p:cNvSpPr txBox="1"/>
           <p:nvPr>
             <p:ph idx="1" type="body"/>
@@ -1101,7 +1101,7 @@
   <p:cSld>
     <p:spTree>
       <p:nvGrpSpPr>
-        <p:cNvPr id="121" name="Shape 121"/>
+        <p:cNvPr id="122" name="Shape 122"/>
         <p:cNvGrpSpPr/>
         <p:nvPr/>
       </p:nvGrpSpPr>
@@ -1115,7 +1115,7 @@
       </p:grpSpPr>
       <p:sp>
         <p:nvSpPr>
-          <p:cNvPr id="122" name="Google Shape;122;g30a6bbba716_0_75:notes"/>
+          <p:cNvPr id="123" name="Google Shape;123;g30a6bbba716_0_75:notes"/>
           <p:cNvSpPr/>
           <p:nvPr>
             <p:ph idx="2" type="sldImg"/>
@@ -1150,7 +1150,7 @@
       </p:sp>
       <p:sp>
         <p:nvSpPr>
-          <p:cNvPr id="123" name="Google Shape;123;g30a6bbba716_0_75:notes"/>
+          <p:cNvPr id="124" name="Google Shape;124;g30a6bbba716_0_75:notes"/>
           <p:cNvSpPr txBox="1"/>
           <p:nvPr>
             <p:ph idx="1" type="body"/>
@@ -1200,7 +1200,7 @@
   <p:cSld>
     <p:spTree>
       <p:nvGrpSpPr>
-        <p:cNvPr id="127" name="Shape 127"/>
+        <p:cNvPr id="128" name="Shape 128"/>
         <p:cNvGrpSpPr/>
         <p:nvPr/>
       </p:nvGrpSpPr>
@@ -1214,7 +1214,7 @@
       </p:grpSpPr>
       <p:sp>
         <p:nvSpPr>
-          <p:cNvPr id="128" name="Google Shape;128;g30b75918de7_0_1:notes"/>
+          <p:cNvPr id="129" name="Google Shape;129;g30b75918de7_0_1:notes"/>
           <p:cNvSpPr/>
           <p:nvPr>
             <p:ph idx="2" type="sldImg"/>
@@ -1249,7 +1249,7 @@
       </p:sp>
       <p:sp>
         <p:nvSpPr>
-          <p:cNvPr id="129" name="Google Shape;129;g30b75918de7_0_1:notes"/>
+          <p:cNvPr id="130" name="Google Shape;130;g30b75918de7_0_1:notes"/>
           <p:cNvSpPr txBox="1"/>
           <p:nvPr>
             <p:ph idx="1" type="body"/>
@@ -1299,7 +1299,7 @@
   <p:cSld>
     <p:spTree>
       <p:nvGrpSpPr>
-        <p:cNvPr id="133" name="Shape 133"/>
+        <p:cNvPr id="134" name="Shape 134"/>
         <p:cNvGrpSpPr/>
         <p:nvPr/>
       </p:nvGrpSpPr>
@@ -1313,7 +1313,7 @@
       </p:grpSpPr>
       <p:sp>
         <p:nvSpPr>
-          <p:cNvPr id="134" name="Google Shape;134;g308b83b05ff_0_148:notes"/>
+          <p:cNvPr id="135" name="Google Shape;135;g308b83b05ff_0_148:notes"/>
           <p:cNvSpPr/>
           <p:nvPr>
             <p:ph idx="2" type="sldImg"/>
@@ -1348,7 +1348,7 @@
       </p:sp>
       <p:sp>
         <p:nvSpPr>
-          <p:cNvPr id="135" name="Google Shape;135;g308b83b05ff_0_148:notes"/>
+          <p:cNvPr id="136" name="Google Shape;136;g308b83b05ff_0_148:notes"/>
           <p:cNvSpPr txBox="1"/>
           <p:nvPr>
             <p:ph idx="1" type="body"/>
@@ -1398,7 +1398,7 @@
   <p:cSld>
     <p:spTree>
       <p:nvGrpSpPr>
-        <p:cNvPr id="55" name="Shape 55"/>
+        <p:cNvPr id="56" name="Shape 56"/>
         <p:cNvGrpSpPr/>
         <p:nvPr/>
       </p:nvGrpSpPr>
@@ -1412,7 +1412,7 @@
       </p:grpSpPr>
       <p:sp>
         <p:nvSpPr>
-          <p:cNvPr id="56" name="Google Shape;56;g2d3e9e281fa_0_0:notes"/>
+          <p:cNvPr id="57" name="Google Shape;57;g2d3e9e281fa_0_0:notes"/>
           <p:cNvSpPr/>
           <p:nvPr>
             <p:ph idx="2" type="sldImg"/>
@@ -1447,7 +1447,7 @@
       </p:sp>
       <p:sp>
         <p:nvSpPr>
-          <p:cNvPr id="57" name="Google Shape;57;g2d3e9e281fa_0_0:notes"/>
+          <p:cNvPr id="58" name="Google Shape;58;g2d3e9e281fa_0_0:notes"/>
           <p:cNvSpPr txBox="1"/>
           <p:nvPr>
             <p:ph idx="1" type="body"/>
@@ -1497,7 +1497,7 @@
   <p:cSld>
     <p:spTree>
       <p:nvGrpSpPr>
-        <p:cNvPr id="61" name="Shape 61"/>
+        <p:cNvPr id="62" name="Shape 62"/>
         <p:cNvGrpSpPr/>
         <p:nvPr/>
       </p:nvGrpSpPr>
@@ -1511,7 +1511,7 @@
       </p:grpSpPr>
       <p:sp>
         <p:nvSpPr>
-          <p:cNvPr id="62" name="Google Shape;62;g30a6bbba716_0_10:notes"/>
+          <p:cNvPr id="63" name="Google Shape;63;g30a6bbba716_0_10:notes"/>
           <p:cNvSpPr/>
           <p:nvPr>
             <p:ph idx="2" type="sldImg"/>
@@ -1546,7 +1546,7 @@
       </p:sp>
       <p:sp>
         <p:nvSpPr>
-          <p:cNvPr id="63" name="Google Shape;63;g30a6bbba716_0_10:notes"/>
+          <p:cNvPr id="64" name="Google Shape;64;g30a6bbba716_0_10:notes"/>
           <p:cNvSpPr txBox="1"/>
           <p:nvPr>
             <p:ph idx="1" type="body"/>
@@ -1596,7 +1596,7 @@
   <p:cSld>
     <p:spTree>
       <p:nvGrpSpPr>
-        <p:cNvPr id="67" name="Shape 67"/>
+        <p:cNvPr id="68" name="Shape 68"/>
         <p:cNvGrpSpPr/>
         <p:nvPr/>
       </p:nvGrpSpPr>
@@ -1610,7 +1610,7 @@
       </p:grpSpPr>
       <p:sp>
         <p:nvSpPr>
-          <p:cNvPr id="68" name="Google Shape;68;g30a6bbba716_0_4:notes"/>
+          <p:cNvPr id="69" name="Google Shape;69;g30a6bbba716_0_4:notes"/>
           <p:cNvSpPr/>
           <p:nvPr>
             <p:ph idx="2" type="sldImg"/>
@@ -1645,7 +1645,7 @@
       </p:sp>
       <p:sp>
         <p:nvSpPr>
-          <p:cNvPr id="69" name="Google Shape;69;g30a6bbba716_0_4:notes"/>
+          <p:cNvPr id="70" name="Google Shape;70;g30a6bbba716_0_4:notes"/>
           <p:cNvSpPr txBox="1"/>
           <p:nvPr>
             <p:ph idx="1" type="body"/>
@@ -1695,7 +1695,7 @@
   <p:cSld>
     <p:spTree>
       <p:nvGrpSpPr>
-        <p:cNvPr id="73" name="Shape 73"/>
+        <p:cNvPr id="74" name="Shape 74"/>
         <p:cNvGrpSpPr/>
         <p:nvPr/>
       </p:nvGrpSpPr>
@@ -1709,7 +1709,7 @@
       </p:grpSpPr>
       <p:sp>
         <p:nvSpPr>
-          <p:cNvPr id="74" name="Google Shape;74;g30a6bbba716_0_21:notes"/>
+          <p:cNvPr id="75" name="Google Shape;75;g30a6bbba716_0_21:notes"/>
           <p:cNvSpPr/>
           <p:nvPr>
             <p:ph idx="2" type="sldImg"/>
@@ -1744,7 +1744,7 @@
       </p:sp>
       <p:sp>
         <p:nvSpPr>
-          <p:cNvPr id="75" name="Google Shape;75;g30a6bbba716_0_21:notes"/>
+          <p:cNvPr id="76" name="Google Shape;76;g30a6bbba716_0_21:notes"/>
           <p:cNvSpPr txBox="1"/>
           <p:nvPr>
             <p:ph idx="1" type="body"/>
@@ -1794,7 +1794,7 @@
   <p:cSld>
     <p:spTree>
       <p:nvGrpSpPr>
-        <p:cNvPr id="79" name="Shape 79"/>
+        <p:cNvPr id="80" name="Shape 80"/>
         <p:cNvGrpSpPr/>
         <p:nvPr/>
       </p:nvGrpSpPr>
@@ -1808,7 +1808,7 @@
       </p:grpSpPr>
       <p:sp>
         <p:nvSpPr>
-          <p:cNvPr id="80" name="Google Shape;80;g30a6bbba716_0_32:notes"/>
+          <p:cNvPr id="81" name="Google Shape;81;g30a6bbba716_0_32:notes"/>
           <p:cNvSpPr/>
           <p:nvPr>
             <p:ph idx="2" type="sldImg"/>
@@ -1843,7 +1843,7 @@
       </p:sp>
       <p:sp>
         <p:nvSpPr>
-          <p:cNvPr id="81" name="Google Shape;81;g30a6bbba716_0_32:notes"/>
+          <p:cNvPr id="82" name="Google Shape;82;g30a6bbba716_0_32:notes"/>
           <p:cNvSpPr txBox="1"/>
           <p:nvPr>
             <p:ph idx="1" type="body"/>
@@ -1893,7 +1893,7 @@
   <p:cSld>
     <p:spTree>
       <p:nvGrpSpPr>
-        <p:cNvPr id="85" name="Shape 85"/>
+        <p:cNvPr id="86" name="Shape 86"/>
         <p:cNvGrpSpPr/>
         <p:nvPr/>
       </p:nvGrpSpPr>
@@ -1907,7 +1907,7 @@
       </p:grpSpPr>
       <p:sp>
         <p:nvSpPr>
-          <p:cNvPr id="86" name="Google Shape;86;g30a6bbba716_0_37:notes"/>
+          <p:cNvPr id="87" name="Google Shape;87;g30a6bbba716_0_37:notes"/>
           <p:cNvSpPr/>
           <p:nvPr>
             <p:ph idx="2" type="sldImg"/>
@@ -1942,7 +1942,7 @@
       </p:sp>
       <p:sp>
         <p:nvSpPr>
-          <p:cNvPr id="87" name="Google Shape;87;g30a6bbba716_0_37:notes"/>
+          <p:cNvPr id="88" name="Google Shape;88;g30a6bbba716_0_37:notes"/>
           <p:cNvSpPr txBox="1"/>
           <p:nvPr>
             <p:ph idx="1" type="body"/>
@@ -1992,7 +1992,7 @@
   <p:cSld>
     <p:spTree>
       <p:nvGrpSpPr>
-        <p:cNvPr id="91" name="Shape 91"/>
+        <p:cNvPr id="92" name="Shape 92"/>
         <p:cNvGrpSpPr/>
         <p:nvPr/>
       </p:nvGrpSpPr>
@@ -2006,7 +2006,7 @@
       </p:grpSpPr>
       <p:sp>
         <p:nvSpPr>
-          <p:cNvPr id="92" name="Google Shape;92;g30a6bbba716_0_43:notes"/>
+          <p:cNvPr id="93" name="Google Shape;93;g30a6bbba716_0_43:notes"/>
           <p:cNvSpPr/>
           <p:nvPr>
             <p:ph idx="2" type="sldImg"/>
@@ -2041,7 +2041,7 @@
       </p:sp>
       <p:sp>
         <p:nvSpPr>
-          <p:cNvPr id="93" name="Google Shape;93;g30a6bbba716_0_43:notes"/>
+          <p:cNvPr id="94" name="Google Shape;94;g30a6bbba716_0_43:notes"/>
           <p:cNvSpPr txBox="1"/>
           <p:nvPr>
             <p:ph idx="1" type="body"/>
@@ -2091,7 +2091,7 @@
   <p:cSld>
     <p:spTree>
       <p:nvGrpSpPr>
-        <p:cNvPr id="97" name="Shape 97"/>
+        <p:cNvPr id="98" name="Shape 98"/>
         <p:cNvGrpSpPr/>
         <p:nvPr/>
       </p:nvGrpSpPr>
@@ -2105,7 +2105,7 @@
       </p:grpSpPr>
       <p:sp>
         <p:nvSpPr>
-          <p:cNvPr id="98" name="Google Shape;98;g30a6bbba716_0_49:notes"/>
+          <p:cNvPr id="99" name="Google Shape;99;g30a6bbba716_0_49:notes"/>
           <p:cNvSpPr/>
           <p:nvPr>
             <p:ph idx="2" type="sldImg"/>
@@ -2140,7 +2140,7 @@
       </p:sp>
       <p:sp>
         <p:nvSpPr>
-          <p:cNvPr id="99" name="Google Shape;99;g30a6bbba716_0_49:notes"/>
+          <p:cNvPr id="100" name="Google Shape;100;g30a6bbba716_0_49:notes"/>
           <p:cNvSpPr txBox="1"/>
           <p:nvPr>
             <p:ph idx="1" type="body"/>
@@ -6857,8 +6857,35 @@
           <p:cNvPicPr preferRelativeResize="0"/>
           <p:nvPr/>
         </p:nvPicPr>
+        <p:blipFill rotWithShape="1">
+          <a:blip r:embed="rId3">
+            <a:alphaModFix/>
+          </a:blip>
+          <a:srcRect b="2308" l="72036" r="0" t="2298"/>
+          <a:stretch/>
+        </p:blipFill>
+        <p:spPr>
+          <a:xfrm>
+            <a:off x="6587050" y="317000"/>
+            <a:ext cx="2556948" cy="4301749"/>
+          </a:xfrm>
+          <a:prstGeom prst="rect">
+            <a:avLst/>
+          </a:prstGeom>
+          <a:noFill/>
+          <a:ln>
+            <a:noFill/>
+          </a:ln>
+        </p:spPr>
+      </p:pic>
+      <p:pic>
+        <p:nvPicPr>
+          <p:cNvPr id="55" name="Google Shape;55;p13" title="Screenshot from 2025-03-17 06-58-08.png"/>
+          <p:cNvPicPr preferRelativeResize="0"/>
+          <p:nvPr/>
+        </p:nvPicPr>
         <p:blipFill>
-          <a:blip r:embed="rId3">
+          <a:blip r:embed="rId4">
             <a:alphaModFix/>
           </a:blip>
           <a:stretch>
@@ -6868,7 +6895,7 @@
         <p:spPr>
           <a:xfrm>
             <a:off x="0" y="317000"/>
-            <a:ext cx="9144003" cy="4509491"/>
+            <a:ext cx="6587050" cy="4301754"/>
           </a:xfrm>
           <a:prstGeom prst="rect">
             <a:avLst/>
@@ -6892,7 +6919,7 @@
   <p:cSld>
     <p:spTree>
       <p:nvGrpSpPr>
-        <p:cNvPr id="106" name="Shape 106"/>
+        <p:cNvPr id="107" name="Shape 107"/>
         <p:cNvGrpSpPr/>
         <p:nvPr/>
       </p:nvGrpSpPr>
@@ -6906,7 +6933,7 @@
       </p:grpSpPr>
       <p:sp>
         <p:nvSpPr>
-          <p:cNvPr id="107" name="Google Shape;107;p22"/>
+          <p:cNvPr id="108" name="Google Shape;108;p22"/>
           <p:cNvSpPr txBox="1"/>
           <p:nvPr>
             <p:ph type="title"/>
@@ -6965,7 +6992,7 @@
       </p:sp>
       <p:sp>
         <p:nvSpPr>
-          <p:cNvPr id="108" name="Google Shape;108;p22"/>
+          <p:cNvPr id="109" name="Google Shape;109;p22"/>
           <p:cNvSpPr txBox="1"/>
           <p:nvPr>
             <p:ph idx="1" type="body"/>
@@ -7468,7 +7495,7 @@
   <p:cSld>
     <p:spTree>
       <p:nvGrpSpPr>
-        <p:cNvPr id="112" name="Shape 112"/>
+        <p:cNvPr id="113" name="Shape 113"/>
         <p:cNvGrpSpPr/>
         <p:nvPr/>
       </p:nvGrpSpPr>
@@ -7482,7 +7509,7 @@
       </p:grpSpPr>
       <p:sp>
         <p:nvSpPr>
-          <p:cNvPr id="113" name="Google Shape;113;p23"/>
+          <p:cNvPr id="114" name="Google Shape;114;p23"/>
           <p:cNvSpPr txBox="1"/>
           <p:nvPr>
             <p:ph type="title"/>
@@ -7541,7 +7568,7 @@
       </p:sp>
       <p:sp>
         <p:nvSpPr>
-          <p:cNvPr id="114" name="Google Shape;114;p23"/>
+          <p:cNvPr id="115" name="Google Shape;115;p23"/>
           <p:cNvSpPr txBox="1"/>
           <p:nvPr>
             <p:ph idx="1" type="body"/>
@@ -7874,7 +7901,7 @@
   <p:cSld>
     <p:spTree>
       <p:nvGrpSpPr>
-        <p:cNvPr id="118" name="Shape 118"/>
+        <p:cNvPr id="119" name="Shape 119"/>
         <p:cNvGrpSpPr/>
         <p:nvPr/>
       </p:nvGrpSpPr>
@@ -7888,7 +7915,7 @@
       </p:grpSpPr>
       <p:sp>
         <p:nvSpPr>
-          <p:cNvPr id="119" name="Google Shape;119;p24"/>
+          <p:cNvPr id="120" name="Google Shape;120;p24"/>
           <p:cNvSpPr txBox="1"/>
           <p:nvPr>
             <p:ph type="title"/>
@@ -7947,7 +7974,7 @@
       </p:sp>
       <p:sp>
         <p:nvSpPr>
-          <p:cNvPr id="120" name="Google Shape;120;p24"/>
+          <p:cNvPr id="121" name="Google Shape;121;p24"/>
           <p:cNvSpPr txBox="1"/>
           <p:nvPr>
             <p:ph idx="1" type="body"/>
@@ -8467,7 +8494,7 @@
   <p:cSld>
     <p:spTree>
       <p:nvGrpSpPr>
-        <p:cNvPr id="124" name="Shape 124"/>
+        <p:cNvPr id="125" name="Shape 125"/>
         <p:cNvGrpSpPr/>
         <p:nvPr/>
       </p:nvGrpSpPr>
@@ -8481,7 +8508,7 @@
       </p:grpSpPr>
       <p:sp>
         <p:nvSpPr>
-          <p:cNvPr id="125" name="Google Shape;125;p25"/>
+          <p:cNvPr id="126" name="Google Shape;126;p25"/>
           <p:cNvSpPr txBox="1"/>
           <p:nvPr>
             <p:ph type="title"/>
@@ -8531,7 +8558,7 @@
       </p:sp>
       <p:sp>
         <p:nvSpPr>
-          <p:cNvPr id="126" name="Google Shape;126;p25"/>
+          <p:cNvPr id="127" name="Google Shape;127;p25"/>
           <p:cNvSpPr txBox="1"/>
           <p:nvPr>
             <p:ph idx="1" type="body"/>
@@ -8731,7 +8758,7 @@
   <p:cSld>
     <p:spTree>
       <p:nvGrpSpPr>
-        <p:cNvPr id="130" name="Shape 130"/>
+        <p:cNvPr id="131" name="Shape 131"/>
         <p:cNvGrpSpPr/>
         <p:nvPr/>
       </p:nvGrpSpPr>
@@ -8745,7 +8772,7 @@
       </p:grpSpPr>
       <p:sp>
         <p:nvSpPr>
-          <p:cNvPr id="131" name="Google Shape;131;p26"/>
+          <p:cNvPr id="132" name="Google Shape;132;p26"/>
           <p:cNvSpPr txBox="1"/>
           <p:nvPr>
             <p:ph type="title"/>
@@ -8795,7 +8822,7 @@
       </p:sp>
       <p:sp>
         <p:nvSpPr>
-          <p:cNvPr id="132" name="Google Shape;132;p26"/>
+          <p:cNvPr id="133" name="Google Shape;133;p26"/>
           <p:cNvSpPr txBox="1"/>
           <p:nvPr>
             <p:ph idx="1" type="body"/>
@@ -9061,7 +9088,7 @@
   <p:cSld>
     <p:spTree>
       <p:nvGrpSpPr>
-        <p:cNvPr id="136" name="Shape 136"/>
+        <p:cNvPr id="137" name="Shape 137"/>
         <p:cNvGrpSpPr/>
         <p:nvPr/>
       </p:nvGrpSpPr>
@@ -9075,7 +9102,7 @@
       </p:grpSpPr>
       <p:sp>
         <p:nvSpPr>
-          <p:cNvPr id="137" name="Google Shape;137;p27"/>
+          <p:cNvPr id="138" name="Google Shape;138;p27"/>
           <p:cNvSpPr txBox="1"/>
           <p:nvPr>
             <p:ph type="title"/>
@@ -9125,7 +9152,7 @@
       </p:sp>
       <p:sp>
         <p:nvSpPr>
-          <p:cNvPr id="138" name="Google Shape;138;p27"/>
+          <p:cNvPr id="139" name="Google Shape;139;p27"/>
           <p:cNvSpPr txBox="1"/>
           <p:nvPr>
             <p:ph idx="1" type="body"/>
@@ -9299,7 +9326,7 @@
   <p:cSld>
     <p:spTree>
       <p:nvGrpSpPr>
-        <p:cNvPr id="58" name="Shape 58"/>
+        <p:cNvPr id="59" name="Shape 59"/>
         <p:cNvGrpSpPr/>
         <p:nvPr/>
       </p:nvGrpSpPr>
@@ -9313,7 +9340,7 @@
       </p:grpSpPr>
       <p:sp>
         <p:nvSpPr>
-          <p:cNvPr id="59" name="Google Shape;59;p14"/>
+          <p:cNvPr id="60" name="Google Shape;60;p14"/>
           <p:cNvSpPr txBox="1"/>
           <p:nvPr>
             <p:ph type="title"/>
@@ -9363,7 +9390,7 @@
       </p:sp>
       <p:sp>
         <p:nvSpPr>
-          <p:cNvPr id="60" name="Google Shape;60;p14"/>
+          <p:cNvPr id="61" name="Google Shape;61;p14"/>
           <p:cNvSpPr txBox="1"/>
           <p:nvPr>
             <p:ph idx="1" type="body"/>
@@ -9622,7 +9649,7 @@
   <p:cSld>
     <p:spTree>
       <p:nvGrpSpPr>
-        <p:cNvPr id="64" name="Shape 64"/>
+        <p:cNvPr id="65" name="Shape 65"/>
         <p:cNvGrpSpPr/>
         <p:nvPr/>
       </p:nvGrpSpPr>
@@ -9636,7 +9663,7 @@
       </p:grpSpPr>
       <p:sp>
         <p:nvSpPr>
-          <p:cNvPr id="65" name="Google Shape;65;p15"/>
+          <p:cNvPr id="66" name="Google Shape;66;p15"/>
           <p:cNvSpPr txBox="1"/>
           <p:nvPr>
             <p:ph type="title"/>
@@ -9694,7 +9721,7 @@
       </p:sp>
       <p:pic>
         <p:nvPicPr>
-          <p:cNvPr id="66" name="Google Shape;66;p15"/>
+          <p:cNvPr id="67" name="Google Shape;67;p15"/>
           <p:cNvPicPr preferRelativeResize="0"/>
           <p:nvPr/>
         </p:nvPicPr>
@@ -9733,7 +9760,7 @@
   <p:cSld>
     <p:spTree>
       <p:nvGrpSpPr>
-        <p:cNvPr id="70" name="Shape 70"/>
+        <p:cNvPr id="71" name="Shape 71"/>
         <p:cNvGrpSpPr/>
         <p:nvPr/>
       </p:nvGrpSpPr>
@@ -9747,7 +9774,7 @@
       </p:grpSpPr>
       <p:sp>
         <p:nvSpPr>
-          <p:cNvPr id="71" name="Google Shape;71;p16"/>
+          <p:cNvPr id="72" name="Google Shape;72;p16"/>
           <p:cNvSpPr txBox="1"/>
           <p:nvPr>
             <p:ph type="title"/>
@@ -9797,7 +9824,7 @@
       </p:sp>
       <p:sp>
         <p:nvSpPr>
-          <p:cNvPr id="72" name="Google Shape;72;p16"/>
+          <p:cNvPr id="73" name="Google Shape;73;p16"/>
           <p:cNvSpPr txBox="1"/>
           <p:nvPr>
             <p:ph idx="1" type="body"/>
@@ -10047,7 +10074,7 @@
   <p:cSld>
     <p:spTree>
       <p:nvGrpSpPr>
-        <p:cNvPr id="76" name="Shape 76"/>
+        <p:cNvPr id="77" name="Shape 77"/>
         <p:cNvGrpSpPr/>
         <p:nvPr/>
       </p:nvGrpSpPr>
@@ -10061,7 +10088,7 @@
       </p:grpSpPr>
       <p:sp>
         <p:nvSpPr>
-          <p:cNvPr id="77" name="Google Shape;77;p17"/>
+          <p:cNvPr id="78" name="Google Shape;78;p17"/>
           <p:cNvSpPr txBox="1"/>
           <p:nvPr>
             <p:ph type="title"/>
@@ -10111,7 +10138,7 @@
       </p:sp>
       <p:sp>
         <p:nvSpPr>
-          <p:cNvPr id="78" name="Google Shape;78;p17"/>
+          <p:cNvPr id="79" name="Google Shape;79;p17"/>
           <p:cNvSpPr txBox="1"/>
           <p:nvPr>
             <p:ph idx="1" type="body"/>
@@ -10423,7 +10450,7 @@
   <p:cSld>
     <p:spTree>
       <p:nvGrpSpPr>
-        <p:cNvPr id="82" name="Shape 82"/>
+        <p:cNvPr id="83" name="Shape 83"/>
         <p:cNvGrpSpPr/>
         <p:nvPr/>
       </p:nvGrpSpPr>
@@ -10437,7 +10464,7 @@
       </p:grpSpPr>
       <p:sp>
         <p:nvSpPr>
-          <p:cNvPr id="83" name="Google Shape;83;p18"/>
+          <p:cNvPr id="84" name="Google Shape;84;p18"/>
           <p:cNvSpPr txBox="1"/>
           <p:nvPr>
             <p:ph type="title"/>
@@ -10487,7 +10514,7 @@
       </p:sp>
       <p:sp>
         <p:nvSpPr>
-          <p:cNvPr id="84" name="Google Shape;84;p18"/>
+          <p:cNvPr id="85" name="Google Shape;85;p18"/>
           <p:cNvSpPr txBox="1"/>
           <p:nvPr>
             <p:ph idx="1" type="body"/>
@@ -10996,7 +11023,7 @@
   <p:cSld>
     <p:spTree>
       <p:nvGrpSpPr>
-        <p:cNvPr id="88" name="Shape 88"/>
+        <p:cNvPr id="89" name="Shape 89"/>
         <p:cNvGrpSpPr/>
         <p:nvPr/>
       </p:nvGrpSpPr>
@@ -11010,7 +11037,7 @@
       </p:grpSpPr>
       <p:sp>
         <p:nvSpPr>
-          <p:cNvPr id="89" name="Google Shape;89;p19"/>
+          <p:cNvPr id="90" name="Google Shape;90;p19"/>
           <p:cNvSpPr txBox="1"/>
           <p:nvPr>
             <p:ph type="title"/>
@@ -11069,7 +11096,7 @@
       </p:sp>
       <p:sp>
         <p:nvSpPr>
-          <p:cNvPr id="90" name="Google Shape;90;p19"/>
+          <p:cNvPr id="91" name="Google Shape;91;p19"/>
           <p:cNvSpPr txBox="1"/>
           <p:nvPr>
             <p:ph idx="1" type="body"/>
@@ -11383,7 +11410,7 @@
   <p:cSld>
     <p:spTree>
       <p:nvGrpSpPr>
-        <p:cNvPr id="94" name="Shape 94"/>
+        <p:cNvPr id="95" name="Shape 95"/>
         <p:cNvGrpSpPr/>
         <p:nvPr/>
       </p:nvGrpSpPr>
@@ -11397,7 +11424,7 @@
       </p:grpSpPr>
       <p:sp>
         <p:nvSpPr>
-          <p:cNvPr id="95" name="Google Shape;95;p20"/>
+          <p:cNvPr id="96" name="Google Shape;96;p20"/>
           <p:cNvSpPr txBox="1"/>
           <p:nvPr>
             <p:ph type="title"/>
@@ -11447,7 +11474,7 @@
       </p:sp>
       <p:sp>
         <p:nvSpPr>
-          <p:cNvPr id="96" name="Google Shape;96;p20"/>
+          <p:cNvPr id="97" name="Google Shape;97;p20"/>
           <p:cNvSpPr txBox="1"/>
           <p:nvPr>
             <p:ph idx="1" type="body"/>
@@ -11848,7 +11875,7 @@
   <p:cSld>
     <p:spTree>
       <p:nvGrpSpPr>
-        <p:cNvPr id="100" name="Shape 100"/>
+        <p:cNvPr id="101" name="Shape 101"/>
         <p:cNvGrpSpPr/>
         <p:nvPr/>
       </p:nvGrpSpPr>
@@ -11862,7 +11889,7 @@
       </p:grpSpPr>
       <p:sp>
         <p:nvSpPr>
-          <p:cNvPr id="101" name="Google Shape;101;p21"/>
+          <p:cNvPr id="102" name="Google Shape;102;p21"/>
           <p:cNvSpPr txBox="1"/>
           <p:nvPr>
             <p:ph type="title"/>
@@ -11921,7 +11948,7 @@
       </p:sp>
       <p:sp>
         <p:nvSpPr>
-          <p:cNvPr id="102" name="Google Shape;102;p21"/>
+          <p:cNvPr id="103" name="Google Shape;103;p21"/>
           <p:cNvSpPr txBox="1"/>
           <p:nvPr>
             <p:ph idx="1" type="body"/>
@@ -12529,6 +12556,285 @@
 </file>
 
 <file path=ppt/theme/theme1.xml><?xml version="1.0" encoding="utf-8"?>
+<a:theme xmlns:a="http://schemas.openxmlformats.org/drawingml/2006/main" xmlns:r="http://schemas.openxmlformats.org/officeDocument/2006/relationships" name="Simple Light">
+  <a:themeElements>
+    <a:clrScheme name="Simple Light">
+      <a:dk1>
+        <a:srgbClr val="000000"/>
+      </a:dk1>
+      <a:lt1>
+        <a:srgbClr val="FFFFFF"/>
+      </a:lt1>
+      <a:dk2>
+        <a:srgbClr val="595959"/>
+      </a:dk2>
+      <a:lt2>
+        <a:srgbClr val="EEEEEE"/>
+      </a:lt2>
+      <a:accent1>
+        <a:srgbClr val="4285F4"/>
+      </a:accent1>
+      <a:accent2>
+        <a:srgbClr val="212121"/>
+      </a:accent2>
+      <a:accent3>
+        <a:srgbClr val="78909C"/>
+      </a:accent3>
+      <a:accent4>
+        <a:srgbClr val="FFAB40"/>
+      </a:accent4>
+      <a:accent5>
+        <a:srgbClr val="0097A7"/>
+      </a:accent5>
+      <a:accent6>
+        <a:srgbClr val="EEFF41"/>
+      </a:accent6>
+      <a:hlink>
+        <a:srgbClr val="0097A7"/>
+      </a:hlink>
+      <a:folHlink>
+        <a:srgbClr val="0097A7"/>
+      </a:folHlink>
+    </a:clrScheme>
+    <a:fontScheme name="Office">
+      <a:majorFont>
+        <a:latin typeface="Arial"/>
+        <a:ea typeface=""/>
+        <a:cs typeface=""/>
+        <a:font script="Jpan" typeface="ＭＳ Ｐゴシック"/>
+        <a:font script="Hang" typeface="맑은 고딕"/>
+        <a:font script="Hans" typeface="宋体"/>
+        <a:font script="Hant" typeface="新細明體"/>
+        <a:font script="Arab" typeface="Times New Roman"/>
+        <a:font script="Hebr" typeface="Times New Roman"/>
+        <a:font script="Thai" typeface="Angsana New"/>
+        <a:font script="Ethi" typeface="Nyala"/>
+        <a:font script="Beng" typeface="Vrinda"/>
+        <a:font script="Gujr" typeface="Shruti"/>
+        <a:font script="Khmr" typeface="MoolBoran"/>
+        <a:font script="Knda" typeface="Tunga"/>
+        <a:font script="Guru" typeface="Raavi"/>
+        <a:font script="Cans" typeface="Euphemia"/>
+        <a:font script="Cher" typeface="Plantagenet Cherokee"/>
+        <a:font script="Yiii" typeface="Microsoft Yi Baiti"/>
+        <a:font script="Tibt" typeface="Microsoft Himalaya"/>
+        <a:font script="Thaa" typeface="MV Boli"/>
+        <a:font script="Deva" typeface="Mangal"/>
+        <a:font script="Telu" typeface="Gautami"/>
+        <a:font script="Taml" typeface="Latha"/>
+        <a:font script="Syrc" typeface="Estrangelo Edessa"/>
+        <a:font script="Orya" typeface="Kalinga"/>
+        <a:font script="Mlym" typeface="Kartika"/>
+        <a:font script="Laoo" typeface="DokChampa"/>
+        <a:font script="Sinh" typeface="Iskoola Pota"/>
+        <a:font script="Mong" typeface="Mongolian Baiti"/>
+        <a:font script="Viet" typeface="Times New Roman"/>
+        <a:font script="Uigh" typeface="Microsoft Uighur"/>
+        <a:font script="Geor" typeface="Sylfaen"/>
+      </a:majorFont>
+      <a:minorFont>
+        <a:latin typeface="Arial"/>
+        <a:ea typeface=""/>
+        <a:cs typeface=""/>
+        <a:font script="Jpan" typeface="ＭＳ Ｐゴシック"/>
+        <a:font script="Hang" typeface="맑은 고딕"/>
+        <a:font script="Hans" typeface="宋体"/>
+        <a:font script="Hant" typeface="新細明體"/>
+        <a:font script="Arab" typeface="Arial"/>
+        <a:font script="Hebr" typeface="Arial"/>
+        <a:font script="Thai" typeface="Cordia New"/>
+        <a:font script="Ethi" typeface="Nyala"/>
+        <a:font script="Beng" typeface="Vrinda"/>
+        <a:font script="Gujr" typeface="Shruti"/>
+        <a:font script="Khmr" typeface="DaunPenh"/>
+        <a:font script="Knda" typeface="Tunga"/>
+        <a:font script="Guru" typeface="Raavi"/>
+        <a:font script="Cans" typeface="Euphemia"/>
+        <a:font script="Cher" typeface="Plantagenet Cherokee"/>
+        <a:font script="Yiii" typeface="Microsoft Yi Baiti"/>
+        <a:font script="Tibt" typeface="Microsoft Himalaya"/>
+        <a:font script="Thaa" typeface="MV Boli"/>
+        <a:font script="Deva" typeface="Mangal"/>
+        <a:font script="Telu" typeface="Gautami"/>
+        <a:font script="Taml" typeface="Latha"/>
+        <a:font script="Syrc" typeface="Estrangelo Edessa"/>
+        <a:font script="Orya" typeface="Kalinga"/>
+        <a:font script="Mlym" typeface="Kartika"/>
+        <a:font script="Laoo" typeface="DokChampa"/>
+        <a:font script="Sinh" typeface="Iskoola Pota"/>
+        <a:font script="Mong" typeface="Mongolian Baiti"/>
+        <a:font script="Viet" typeface="Arial"/>
+        <a:font script="Uigh" typeface="Microsoft Uighur"/>
+        <a:font script="Geor" typeface="Sylfaen"/>
+      </a:minorFont>
+    </a:fontScheme>
+    <a:fmtScheme name="Office">
+      <a:fillStyleLst>
+        <a:solidFill>
+          <a:schemeClr val="phClr"/>
+        </a:solidFill>
+        <a:gradFill rotWithShape="1">
+          <a:gsLst>
+            <a:gs pos="0">
+              <a:schemeClr val="phClr">
+                <a:tint val="50000"/>
+                <a:satMod val="300000"/>
+              </a:schemeClr>
+            </a:gs>
+            <a:gs pos="35000">
+              <a:schemeClr val="phClr">
+                <a:tint val="37000"/>
+                <a:satMod val="300000"/>
+              </a:schemeClr>
+            </a:gs>
+            <a:gs pos="100000">
+              <a:schemeClr val="phClr">
+                <a:tint val="15000"/>
+                <a:satMod val="350000"/>
+              </a:schemeClr>
+            </a:gs>
+          </a:gsLst>
+          <a:lin ang="16200000" scaled="1"/>
+        </a:gradFill>
+        <a:gradFill rotWithShape="1">
+          <a:gsLst>
+            <a:gs pos="0">
+              <a:schemeClr val="phClr">
+                <a:tint val="100000"/>
+                <a:shade val="100000"/>
+                <a:satMod val="130000"/>
+              </a:schemeClr>
+            </a:gs>
+            <a:gs pos="100000">
+              <a:schemeClr val="phClr">
+                <a:tint val="50000"/>
+                <a:shade val="100000"/>
+                <a:satMod val="350000"/>
+              </a:schemeClr>
+            </a:gs>
+          </a:gsLst>
+          <a:lin ang="16200000" scaled="0"/>
+        </a:gradFill>
+      </a:fillStyleLst>
+      <a:lnStyleLst>
+        <a:ln w="9525" cap="flat" cmpd="sng" algn="ctr">
+          <a:solidFill>
+            <a:schemeClr val="phClr">
+              <a:shade val="95000"/>
+              <a:satMod val="105000"/>
+            </a:schemeClr>
+          </a:solidFill>
+          <a:prstDash val="solid"/>
+        </a:ln>
+        <a:ln w="25400" cap="flat" cmpd="sng" algn="ctr">
+          <a:solidFill>
+            <a:schemeClr val="phClr"/>
+          </a:solidFill>
+          <a:prstDash val="solid"/>
+        </a:ln>
+        <a:ln w="38100" cap="flat" cmpd="sng" algn="ctr">
+          <a:solidFill>
+            <a:schemeClr val="phClr"/>
+          </a:solidFill>
+          <a:prstDash val="solid"/>
+        </a:ln>
+      </a:lnStyleLst>
+      <a:effectStyleLst>
+        <a:effectStyle>
+          <a:effectLst>
+            <a:outerShdw blurRad="40000" dist="20000" dir="5400000" rotWithShape="0">
+              <a:srgbClr val="000000">
+                <a:alpha val="38000"/>
+              </a:srgbClr>
+            </a:outerShdw>
+          </a:effectLst>
+        </a:effectStyle>
+        <a:effectStyle>
+          <a:effectLst>
+            <a:outerShdw blurRad="40000" dist="23000" dir="5400000" rotWithShape="0">
+              <a:srgbClr val="000000">
+                <a:alpha val="35000"/>
+              </a:srgbClr>
+            </a:outerShdw>
+          </a:effectLst>
+        </a:effectStyle>
+        <a:effectStyle>
+          <a:effectLst>
+            <a:outerShdw blurRad="40000" dist="23000" dir="5400000" rotWithShape="0">
+              <a:srgbClr val="000000">
+                <a:alpha val="35000"/>
+              </a:srgbClr>
+            </a:outerShdw>
+          </a:effectLst>
+          <a:scene3d>
+            <a:camera prst="orthographicFront">
+              <a:rot lat="0" lon="0" rev="0"/>
+            </a:camera>
+            <a:lightRig rig="threePt" dir="t">
+              <a:rot lat="0" lon="0" rev="1200000"/>
+            </a:lightRig>
+          </a:scene3d>
+          <a:sp3d>
+            <a:bevelT w="63500" h="25400"/>
+          </a:sp3d>
+        </a:effectStyle>
+      </a:effectStyleLst>
+      <a:bgFillStyleLst>
+        <a:solidFill>
+          <a:schemeClr val="phClr"/>
+        </a:solidFill>
+        <a:gradFill rotWithShape="1">
+          <a:gsLst>
+            <a:gs pos="0">
+              <a:schemeClr val="phClr">
+                <a:tint val="40000"/>
+                <a:satMod val="350000"/>
+              </a:schemeClr>
+            </a:gs>
+            <a:gs pos="40000">
+              <a:schemeClr val="phClr">
+                <a:tint val="45000"/>
+                <a:shade val="99000"/>
+                <a:satMod val="350000"/>
+              </a:schemeClr>
+            </a:gs>
+            <a:gs pos="100000">
+              <a:schemeClr val="phClr">
+                <a:shade val="20000"/>
+                <a:satMod val="255000"/>
+              </a:schemeClr>
+            </a:gs>
+          </a:gsLst>
+          <a:path path="circle">
+            <a:fillToRect l="50000" t="-80000" r="50000" b="180000"/>
+          </a:path>
+        </a:gradFill>
+        <a:gradFill rotWithShape="1">
+          <a:gsLst>
+            <a:gs pos="0">
+              <a:schemeClr val="phClr">
+                <a:tint val="80000"/>
+                <a:satMod val="300000"/>
+              </a:schemeClr>
+            </a:gs>
+            <a:gs pos="100000">
+              <a:schemeClr val="phClr">
+                <a:shade val="30000"/>
+                <a:satMod val="200000"/>
+              </a:schemeClr>
+            </a:gs>
+          </a:gsLst>
+          <a:path path="circle">
+            <a:fillToRect l="50000" t="50000" r="50000" b="50000"/>
+          </a:path>
+        </a:gradFill>
+      </a:bgFillStyleLst>
+    </a:fmtScheme>
+  </a:themeElements>
+</a:theme>
+</file>
+
+<file path=ppt/theme/theme2.xml><?xml version="1.0" encoding="utf-8"?>
 <a:theme xmlns:a="http://schemas.openxmlformats.org/drawingml/2006/main" xmlns:r="http://schemas.openxmlformats.org/officeDocument/2006/relationships">
   <a:themeElements>
     <a:clrScheme name="Default">
@@ -12805,283 +13111,4 @@
     </a:fmtScheme>
   </a:themeElements>
 </a:theme>
-</file>
-
-<file path=ppt/theme/theme2.xml><?xml version="1.0" encoding="utf-8"?>
-<a:theme xmlns:a="http://schemas.openxmlformats.org/drawingml/2006/main" xmlns:r="http://schemas.openxmlformats.org/officeDocument/2006/relationships" name="Simple Light">
-  <a:themeElements>
-    <a:clrScheme name="Simple Light">
-      <a:dk1>
-        <a:srgbClr val="000000"/>
-      </a:dk1>
-      <a:lt1>
-        <a:srgbClr val="FFFFFF"/>
-      </a:lt1>
-      <a:dk2>
-        <a:srgbClr val="595959"/>
-      </a:dk2>
-      <a:lt2>
-        <a:srgbClr val="EEEEEE"/>
-      </a:lt2>
-      <a:accent1>
-        <a:srgbClr val="4285F4"/>
-      </a:accent1>
-      <a:accent2>
-        <a:srgbClr val="212121"/>
-      </a:accent2>
-      <a:accent3>
-        <a:srgbClr val="78909C"/>
-      </a:accent3>
-      <a:accent4>
-        <a:srgbClr val="FFAB40"/>
-      </a:accent4>
-      <a:accent5>
-        <a:srgbClr val="0097A7"/>
-      </a:accent5>
-      <a:accent6>
-        <a:srgbClr val="EEFF41"/>
-      </a:accent6>
-      <a:hlink>
-        <a:srgbClr val="0097A7"/>
-      </a:hlink>
-      <a:folHlink>
-        <a:srgbClr val="0097A7"/>
-      </a:folHlink>
-    </a:clrScheme>
-    <a:fontScheme name="Office">
-      <a:majorFont>
-        <a:latin typeface="Arial"/>
-        <a:ea typeface=""/>
-        <a:cs typeface=""/>
-        <a:font script="Jpan" typeface="ＭＳ Ｐゴシック"/>
-        <a:font script="Hang" typeface="맑은 고딕"/>
-        <a:font script="Hans" typeface="宋体"/>
-        <a:font script="Hant" typeface="新細明體"/>
-        <a:font script="Arab" typeface="Times New Roman"/>
-        <a:font script="Hebr" typeface="Times New Roman"/>
-        <a:font script="Thai" typeface="Angsana New"/>
-        <a:font script="Ethi" typeface="Nyala"/>
-        <a:font script="Beng" typeface="Vrinda"/>
-        <a:font script="Gujr" typeface="Shruti"/>
-        <a:font script="Khmr" typeface="MoolBoran"/>
-        <a:font script="Knda" typeface="Tunga"/>
-        <a:font script="Guru" typeface="Raavi"/>
-        <a:font script="Cans" typeface="Euphemia"/>
-        <a:font script="Cher" typeface="Plantagenet Cherokee"/>
-        <a:font script="Yiii" typeface="Microsoft Yi Baiti"/>
-        <a:font script="Tibt" typeface="Microsoft Himalaya"/>
-        <a:font script="Thaa" typeface="MV Boli"/>
-        <a:font script="Deva" typeface="Mangal"/>
-        <a:font script="Telu" typeface="Gautami"/>
-        <a:font script="Taml" typeface="Latha"/>
-        <a:font script="Syrc" typeface="Estrangelo Edessa"/>
-        <a:font script="Orya" typeface="Kalinga"/>
-        <a:font script="Mlym" typeface="Kartika"/>
-        <a:font script="Laoo" typeface="DokChampa"/>
-        <a:font script="Sinh" typeface="Iskoola Pota"/>
-        <a:font script="Mong" typeface="Mongolian Baiti"/>
-        <a:font script="Viet" typeface="Times New Roman"/>
-        <a:font script="Uigh" typeface="Microsoft Uighur"/>
-        <a:font script="Geor" typeface="Sylfaen"/>
-      </a:majorFont>
-      <a:minorFont>
-        <a:latin typeface="Arial"/>
-        <a:ea typeface=""/>
-        <a:cs typeface=""/>
-        <a:font script="Jpan" typeface="ＭＳ Ｐゴシック"/>
-        <a:font script="Hang" typeface="맑은 고딕"/>
-        <a:font script="Hans" typeface="宋体"/>
-        <a:font script="Hant" typeface="新細明體"/>
-        <a:font script="Arab" typeface="Arial"/>
-        <a:font script="Hebr" typeface="Arial"/>
-        <a:font script="Thai" typeface="Cordia New"/>
-        <a:font script="Ethi" typeface="Nyala"/>
-        <a:font script="Beng" typeface="Vrinda"/>
-        <a:font script="Gujr" typeface="Shruti"/>
-        <a:font script="Khmr" typeface="DaunPenh"/>
-        <a:font script="Knda" typeface="Tunga"/>
-        <a:font script="Guru" typeface="Raavi"/>
-        <a:font script="Cans" typeface="Euphemia"/>
-        <a:font script="Cher" typeface="Plantagenet Cherokee"/>
-        <a:font script="Yiii" typeface="Microsoft Yi Baiti"/>
-        <a:font script="Tibt" typeface="Microsoft Himalaya"/>
-        <a:font script="Thaa" typeface="MV Boli"/>
-        <a:font script="Deva" typeface="Mangal"/>
-        <a:font script="Telu" typeface="Gautami"/>
-        <a:font script="Taml" typeface="Latha"/>
-        <a:font script="Syrc" typeface="Estrangelo Edessa"/>
-        <a:font script="Orya" typeface="Kalinga"/>
-        <a:font script="Mlym" typeface="Kartika"/>
-        <a:font script="Laoo" typeface="DokChampa"/>
-        <a:font script="Sinh" typeface="Iskoola Pota"/>
-        <a:font script="Mong" typeface="Mongolian Baiti"/>
-        <a:font script="Viet" typeface="Arial"/>
-        <a:font script="Uigh" typeface="Microsoft Uighur"/>
-        <a:font script="Geor" typeface="Sylfaen"/>
-      </a:minorFont>
-    </a:fontScheme>
-    <a:fmtScheme name="Office">
-      <a:fillStyleLst>
-        <a:solidFill>
-          <a:schemeClr val="phClr"/>
-        </a:solidFill>
-        <a:gradFill rotWithShape="1">
-          <a:gsLst>
-            <a:gs pos="0">
-              <a:schemeClr val="phClr">
-                <a:tint val="50000"/>
-                <a:satMod val="300000"/>
-              </a:schemeClr>
-            </a:gs>
-            <a:gs pos="35000">
-              <a:schemeClr val="phClr">
-                <a:tint val="37000"/>
-                <a:satMod val="300000"/>
-              </a:schemeClr>
-            </a:gs>
-            <a:gs pos="100000">
-              <a:schemeClr val="phClr">
-                <a:tint val="15000"/>
-                <a:satMod val="350000"/>
-              </a:schemeClr>
-            </a:gs>
-          </a:gsLst>
-          <a:lin ang="16200000" scaled="1"/>
-        </a:gradFill>
-        <a:gradFill rotWithShape="1">
-          <a:gsLst>
-            <a:gs pos="0">
-              <a:schemeClr val="phClr">
-                <a:tint val="100000"/>
-                <a:shade val="100000"/>
-                <a:satMod val="130000"/>
-              </a:schemeClr>
-            </a:gs>
-            <a:gs pos="100000">
-              <a:schemeClr val="phClr">
-                <a:tint val="50000"/>
-                <a:shade val="100000"/>
-                <a:satMod val="350000"/>
-              </a:schemeClr>
-            </a:gs>
-          </a:gsLst>
-          <a:lin ang="16200000" scaled="0"/>
-        </a:gradFill>
-      </a:fillStyleLst>
-      <a:lnStyleLst>
-        <a:ln w="9525" cap="flat" cmpd="sng" algn="ctr">
-          <a:solidFill>
-            <a:schemeClr val="phClr">
-              <a:shade val="95000"/>
-              <a:satMod val="105000"/>
-            </a:schemeClr>
-          </a:solidFill>
-          <a:prstDash val="solid"/>
-        </a:ln>
-        <a:ln w="25400" cap="flat" cmpd="sng" algn="ctr">
-          <a:solidFill>
-            <a:schemeClr val="phClr"/>
-          </a:solidFill>
-          <a:prstDash val="solid"/>
-        </a:ln>
-        <a:ln w="38100" cap="flat" cmpd="sng" algn="ctr">
-          <a:solidFill>
-            <a:schemeClr val="phClr"/>
-          </a:solidFill>
-          <a:prstDash val="solid"/>
-        </a:ln>
-      </a:lnStyleLst>
-      <a:effectStyleLst>
-        <a:effectStyle>
-          <a:effectLst>
-            <a:outerShdw blurRad="40000" dist="20000" dir="5400000" rotWithShape="0">
-              <a:srgbClr val="000000">
-                <a:alpha val="38000"/>
-              </a:srgbClr>
-            </a:outerShdw>
-          </a:effectLst>
-        </a:effectStyle>
-        <a:effectStyle>
-          <a:effectLst>
-            <a:outerShdw blurRad="40000" dist="23000" dir="5400000" rotWithShape="0">
-              <a:srgbClr val="000000">
-                <a:alpha val="35000"/>
-              </a:srgbClr>
-            </a:outerShdw>
-          </a:effectLst>
-        </a:effectStyle>
-        <a:effectStyle>
-          <a:effectLst>
-            <a:outerShdw blurRad="40000" dist="23000" dir="5400000" rotWithShape="0">
-              <a:srgbClr val="000000">
-                <a:alpha val="35000"/>
-              </a:srgbClr>
-            </a:outerShdw>
-          </a:effectLst>
-          <a:scene3d>
-            <a:camera prst="orthographicFront">
-              <a:rot lat="0" lon="0" rev="0"/>
-            </a:camera>
-            <a:lightRig rig="threePt" dir="t">
-              <a:rot lat="0" lon="0" rev="1200000"/>
-            </a:lightRig>
-          </a:scene3d>
-          <a:sp3d>
-            <a:bevelT w="63500" h="25400"/>
-          </a:sp3d>
-        </a:effectStyle>
-      </a:effectStyleLst>
-      <a:bgFillStyleLst>
-        <a:solidFill>
-          <a:schemeClr val="phClr"/>
-        </a:solidFill>
-        <a:gradFill rotWithShape="1">
-          <a:gsLst>
-            <a:gs pos="0">
-              <a:schemeClr val="phClr">
-                <a:tint val="40000"/>
-                <a:satMod val="350000"/>
-              </a:schemeClr>
-            </a:gs>
-            <a:gs pos="40000">
-              <a:schemeClr val="phClr">
-                <a:tint val="45000"/>
-                <a:shade val="99000"/>
-                <a:satMod val="350000"/>
-              </a:schemeClr>
-            </a:gs>
-            <a:gs pos="100000">
-              <a:schemeClr val="phClr">
-                <a:shade val="20000"/>
-                <a:satMod val="255000"/>
-              </a:schemeClr>
-            </a:gs>
-          </a:gsLst>
-          <a:path path="circle">
-            <a:fillToRect l="50000" t="-80000" r="50000" b="180000"/>
-          </a:path>
-        </a:gradFill>
-        <a:gradFill rotWithShape="1">
-          <a:gsLst>
-            <a:gs pos="0">
-              <a:schemeClr val="phClr">
-                <a:tint val="80000"/>
-                <a:satMod val="300000"/>
-              </a:schemeClr>
-            </a:gs>
-            <a:gs pos="100000">
-              <a:schemeClr val="phClr">
-                <a:shade val="30000"/>
-                <a:satMod val="200000"/>
-              </a:schemeClr>
-            </a:gs>
-          </a:gsLst>
-          <a:path path="circle">
-            <a:fillToRect l="50000" t="50000" r="50000" b="50000"/>
-          </a:path>
-        </a:gradFill>
-      </a:bgFillStyleLst>
-    </a:fmtScheme>
-  </a:themeElements>
-</a:theme>
 </file>
</xml_diff>